<commit_message>
Small fix in slide.
</commit_message>
<xml_diff>
--- a/slides/Introduction to git.pptx
+++ b/slides/Introduction to git.pptx
@@ -236,7 +236,7 @@
           <a:p>
             <a:fld id="{B4927FE6-A6CC-4CAC-8D6B-C7E2EC85FB52}" type="datetimeFigureOut">
               <a:rPr lang="sv-SE" smtClean="0"/>
-              <a:t>2019-03-21</a:t>
+              <a:t>2019-03-25</a:t>
             </a:fld>
             <a:endParaRPr lang="sv-SE" dirty="0"/>
           </a:p>
@@ -683,7 +683,7 @@
           <a:p>
             <a:fld id="{A9D13D6F-DF45-4A75-9D79-1CE93A99BEA7}" type="datetimeFigureOut">
               <a:rPr lang="sv-SE" smtClean="0"/>
-              <a:t>2019-03-21</a:t>
+              <a:t>2019-03-25</a:t>
             </a:fld>
             <a:endParaRPr lang="sv-SE" dirty="0"/>
           </a:p>
@@ -890,7 +890,7 @@
           <a:p>
             <a:fld id="{A9D13D6F-DF45-4A75-9D79-1CE93A99BEA7}" type="datetimeFigureOut">
               <a:rPr lang="sv-SE" smtClean="0"/>
-              <a:t>2019-03-21</a:t>
+              <a:t>2019-03-25</a:t>
             </a:fld>
             <a:endParaRPr lang="sv-SE" dirty="0"/>
           </a:p>
@@ -1068,7 +1068,7 @@
           <a:p>
             <a:fld id="{A9D13D6F-DF45-4A75-9D79-1CE93A99BEA7}" type="datetimeFigureOut">
               <a:rPr lang="sv-SE" smtClean="0"/>
-              <a:t>2019-03-21</a:t>
+              <a:t>2019-03-25</a:t>
             </a:fld>
             <a:endParaRPr lang="sv-SE" dirty="0"/>
           </a:p>
@@ -1272,7 +1272,7 @@
           <a:p>
             <a:fld id="{A9D13D6F-DF45-4A75-9D79-1CE93A99BEA7}" type="datetimeFigureOut">
               <a:rPr lang="sv-SE" smtClean="0"/>
-              <a:t>2019-03-21</a:t>
+              <a:t>2019-03-25</a:t>
             </a:fld>
             <a:endParaRPr lang="sv-SE" dirty="0"/>
           </a:p>
@@ -1517,7 +1517,7 @@
           <a:p>
             <a:fld id="{A9D13D6F-DF45-4A75-9D79-1CE93A99BEA7}" type="datetimeFigureOut">
               <a:rPr lang="sv-SE" smtClean="0"/>
-              <a:t>2019-03-21</a:t>
+              <a:t>2019-03-25</a:t>
             </a:fld>
             <a:endParaRPr lang="sv-SE" dirty="0"/>
           </a:p>
@@ -1842,7 +1842,7 @@
           <a:p>
             <a:fld id="{A9D13D6F-DF45-4A75-9D79-1CE93A99BEA7}" type="datetimeFigureOut">
               <a:rPr lang="sv-SE" smtClean="0"/>
-              <a:t>2019-03-21</a:t>
+              <a:t>2019-03-25</a:t>
             </a:fld>
             <a:endParaRPr lang="sv-SE" dirty="0"/>
           </a:p>
@@ -2305,7 +2305,7 @@
           <a:p>
             <a:fld id="{A9D13D6F-DF45-4A75-9D79-1CE93A99BEA7}" type="datetimeFigureOut">
               <a:rPr lang="sv-SE" smtClean="0"/>
-              <a:t>2019-03-21</a:t>
+              <a:t>2019-03-25</a:t>
             </a:fld>
             <a:endParaRPr lang="sv-SE" dirty="0"/>
           </a:p>
@@ -2422,7 +2422,7 @@
           <a:p>
             <a:fld id="{A9D13D6F-DF45-4A75-9D79-1CE93A99BEA7}" type="datetimeFigureOut">
               <a:rPr lang="sv-SE" smtClean="0"/>
-              <a:t>2019-03-21</a:t>
+              <a:t>2019-03-25</a:t>
             </a:fld>
             <a:endParaRPr lang="sv-SE" dirty="0"/>
           </a:p>
@@ -2517,7 +2517,7 @@
           <a:p>
             <a:fld id="{A9D13D6F-DF45-4A75-9D79-1CE93A99BEA7}" type="datetimeFigureOut">
               <a:rPr lang="sv-SE" smtClean="0"/>
-              <a:t>2019-03-21</a:t>
+              <a:t>2019-03-25</a:t>
             </a:fld>
             <a:endParaRPr lang="sv-SE" dirty="0"/>
           </a:p>
@@ -2804,7 +2804,7 @@
           <a:p>
             <a:fld id="{A9D13D6F-DF45-4A75-9D79-1CE93A99BEA7}" type="datetimeFigureOut">
               <a:rPr lang="sv-SE" smtClean="0"/>
-              <a:t>2019-03-21</a:t>
+              <a:t>2019-03-25</a:t>
             </a:fld>
             <a:endParaRPr lang="sv-SE" dirty="0"/>
           </a:p>
@@ -3064,7 +3064,7 @@
           <a:p>
             <a:fld id="{A9D13D6F-DF45-4A75-9D79-1CE93A99BEA7}" type="datetimeFigureOut">
               <a:rPr lang="sv-SE" smtClean="0"/>
-              <a:t>2019-03-21</a:t>
+              <a:t>2019-03-25</a:t>
             </a:fld>
             <a:endParaRPr lang="sv-SE" dirty="0"/>
           </a:p>
@@ -3278,7 +3278,7 @@
           <a:p>
             <a:fld id="{A9D13D6F-DF45-4A75-9D79-1CE93A99BEA7}" type="datetimeFigureOut">
               <a:rPr lang="sv-SE" smtClean="0"/>
-              <a:t>2019-03-21</a:t>
+              <a:t>2019-03-25</a:t>
             </a:fld>
             <a:endParaRPr lang="sv-SE" dirty="0"/>
           </a:p>
@@ -4686,10 +4686,7 @@
               <a:rPr lang="sv-SE" dirty="0" err="1"/>
               <a:t>branch</a:t>
             </a:r>
-            <a:r>
-              <a:rPr lang="sv-SE" dirty="0"/>
-              <a:t> for it</a:t>
-            </a:r>
+            <a:endParaRPr lang="sv-SE" dirty="0"/>
           </a:p>
           <a:p>
             <a:r>
@@ -5030,25 +5027,36 @@
           </a:p>
           <a:p>
             <a:r>
-              <a:rPr lang="sv-SE" dirty="0"/>
-              <a:t>http://</a:t>
-            </a:r>
-            <a:r>
-              <a:rPr lang="sv-SE" dirty="0" err="1"/>
-              <a:t>think</a:t>
-            </a:r>
-            <a:r>
-              <a:rPr lang="sv-SE" dirty="0"/>
-              <a:t>-like-a-</a:t>
-            </a:r>
-            <a:r>
-              <a:rPr lang="sv-SE" dirty="0" err="1"/>
-              <a:t>git.net</a:t>
-            </a:r>
-            <a:r>
-              <a:rPr lang="sv-SE" dirty="0"/>
-              <a:t>/</a:t>
-            </a:r>
+              <a:rPr lang="sv-SE" dirty="0">
+                <a:hlinkClick r:id="rId4"/>
+              </a:rPr>
+              <a:t>http://think-like-a-git.net/</a:t>
+            </a:r>
+            <a:endParaRPr lang="sv-SE" dirty="0"/>
+          </a:p>
+          <a:p>
+            <a:r>
+              <a:rPr lang="sv-SE" dirty="0">
+                <a:hlinkClick r:id="rId5"/>
+              </a:rPr>
+              <a:t>https://gitignore.io/</a:t>
+            </a:r>
+            <a:endParaRPr lang="sv-SE" dirty="0"/>
+          </a:p>
+          <a:p>
+            <a:r>
+              <a:rPr lang="sv-SE" dirty="0">
+                <a:hlinkClick r:id="rId6"/>
+              </a:rPr>
+              <a:t>https://github.com/Microsoft/Git-Credential-Manager-for-Windows</a:t>
+            </a:r>
+            <a:endParaRPr lang="sv-SE" dirty="0"/>
+          </a:p>
+          <a:p>
+            <a:pPr marL="0" indent="0">
+              <a:buNone/>
+            </a:pPr>
+            <a:endParaRPr lang="sv-SE" dirty="0"/>
           </a:p>
         </p:txBody>
       </p:sp>
@@ -8929,23 +8937,7 @@
           <a:p>
             <a:r>
               <a:rPr lang="sv-SE" dirty="0"/>
-              <a:t>http://</a:t>
-            </a:r>
-            <a:r>
-              <a:rPr lang="sv-SE" dirty="0" err="1"/>
-              <a:t>git-school.github.io</a:t>
-            </a:r>
-            <a:r>
-              <a:rPr lang="sv-SE" dirty="0"/>
-              <a:t>/</a:t>
-            </a:r>
-            <a:r>
-              <a:rPr lang="sv-SE" dirty="0" err="1"/>
-              <a:t>visualizing-git</a:t>
-            </a:r>
-            <a:r>
-              <a:rPr lang="sv-SE" dirty="0"/>
-              <a:t>/</a:t>
+              <a:t> </a:t>
             </a:r>
           </a:p>
         </p:txBody>
@@ -9555,18 +9547,18 @@
 </file>
 
 <file path=customXml/item1.xml><?xml version="1.0" encoding="utf-8"?>
-<p:properties xmlns:p="http://schemas.microsoft.com/office/2006/metadata/properties" xmlns:xsi="http://www.w3.org/2001/XMLSchema-instance" xmlns:pc="http://schemas.microsoft.com/office/infopath/2007/PartnerControls">
-  <documentManagement/>
-</p:properties>
-</file>
-
-<file path=customXml/item2.xml><?xml version="1.0" encoding="utf-8"?>
 <?mso-contentType ?>
 <FormTemplates xmlns="http://schemas.microsoft.com/sharepoint/v3/contenttype/forms">
   <Display>DocumentLibraryForm</Display>
   <Edit>DocumentLibraryForm</Edit>
   <New>DocumentLibraryForm</New>
 </FormTemplates>
+</file>
+
+<file path=customXml/item2.xml><?xml version="1.0" encoding="utf-8"?>
+<p:properties xmlns:p="http://schemas.microsoft.com/office/2006/metadata/properties" xmlns:xsi="http://www.w3.org/2001/XMLSchema-instance" xmlns:pc="http://schemas.microsoft.com/office/infopath/2007/PartnerControls">
+  <documentManagement/>
+</p:properties>
 </file>
 
 <file path=customXml/item3.xml><?xml version="1.0" encoding="utf-8"?>
@@ -9735,18 +9727,18 @@
 </file>
 
 <file path=customXml/itemProps1.xml><?xml version="1.0" encoding="utf-8"?>
-<ds:datastoreItem xmlns:ds="http://schemas.openxmlformats.org/officeDocument/2006/customXml" ds:itemID="{A538565C-9970-4116-BDA7-9527864CBAF9}">
+<ds:datastoreItem xmlns:ds="http://schemas.openxmlformats.org/officeDocument/2006/customXml" ds:itemID="{CE4DDB96-8611-4C18-8F15-4D0CFD7E4681}">
   <ds:schemaRefs>
-    <ds:schemaRef ds:uri="http://schemas.microsoft.com/office/2006/metadata/properties"/>
-    <ds:schemaRef ds:uri="http://schemas.microsoft.com/office/infopath/2007/PartnerControls"/>
+    <ds:schemaRef ds:uri="http://schemas.microsoft.com/sharepoint/v3/contenttype/forms"/>
   </ds:schemaRefs>
 </ds:datastoreItem>
 </file>
 
 <file path=customXml/itemProps2.xml><?xml version="1.0" encoding="utf-8"?>
-<ds:datastoreItem xmlns:ds="http://schemas.openxmlformats.org/officeDocument/2006/customXml" ds:itemID="{CE4DDB96-8611-4C18-8F15-4D0CFD7E4681}">
+<ds:datastoreItem xmlns:ds="http://schemas.openxmlformats.org/officeDocument/2006/customXml" ds:itemID="{A538565C-9970-4116-BDA7-9527864CBAF9}">
   <ds:schemaRefs>
-    <ds:schemaRef ds:uri="http://schemas.microsoft.com/sharepoint/v3/contenttype/forms"/>
+    <ds:schemaRef ds:uri="http://schemas.microsoft.com/office/2006/metadata/properties"/>
+    <ds:schemaRef ds:uri="http://schemas.microsoft.com/office/infopath/2007/PartnerControls"/>
   </ds:schemaRefs>
 </ds:datastoreItem>
 </file>

</xml_diff>